<commit_message>
adjust powerpoint for section 4
</commit_message>
<xml_diff>
--- a/section4/Section 4 Explanatory Notes.pptx
+++ b/section4/Section 4 Explanatory Notes.pptx
@@ -110,6 +110,11 @@
       </a:defRPr>
     </a:lvl9pPr>
   </p:defaultTextStyle>
+  <p:extLst>
+    <p:ext uri="{EFAFB233-063F-42B5-8137-9DF3F51BA10A}">
+      <p15:sldGuideLst xmlns:p15="http://schemas.microsoft.com/office/powerpoint/2012/main"/>
+    </p:ext>
+  </p:extLst>
 </p:presentation>
 </file>
 
@@ -3413,6 +3418,36 @@
           <a:chExt cx="0" cy="0"/>
         </a:xfrm>
       </p:grpSpPr>
+      <p:pic>
+        <p:nvPicPr>
+          <p:cNvPr id="9" name="Picture 8">
+            <a:extLst>
+              <a:ext uri="{FF2B5EF4-FFF2-40B4-BE49-F238E27FC236}">
+                <a16:creationId xmlns:a16="http://schemas.microsoft.com/office/drawing/2014/main" id="{1677DB00-CB61-8382-B204-5941B1636A56}"/>
+              </a:ext>
+            </a:extLst>
+          </p:cNvPr>
+          <p:cNvPicPr>
+            <a:picLocks noChangeAspect="1"/>
+          </p:cNvPicPr>
+          <p:nvPr/>
+        </p:nvPicPr>
+        <p:blipFill>
+          <a:blip r:embed="rId2"/>
+          <a:stretch>
+            <a:fillRect/>
+          </a:stretch>
+        </p:blipFill>
+        <p:spPr>
+          <a:xfrm>
+            <a:off x="252639" y="1493364"/>
+            <a:ext cx="8100893" cy="4882218"/>
+          </a:xfrm>
+          <a:prstGeom prst="rect">
+            <a:avLst/>
+          </a:prstGeom>
+        </p:spPr>
+      </p:pic>
       <p:sp>
         <p:nvSpPr>
           <p:cNvPr id="2" name="Title 1">
@@ -3471,8 +3506,13 @@
           <a:p>
             <a:r>
               <a:rPr lang="en-US" dirty="0"/>
-              <a:t>Implemented using Power BI</a:t>
-            </a:r>
+              <a:t>Implemented using </a:t>
+            </a:r>
+            <a:r>
+              <a:rPr lang="en-US"/>
+              <a:t>Power BI</a:t>
+            </a:r>
+            <a:endParaRPr lang="en-US" dirty="0"/>
           </a:p>
           <a:p>
             <a:r>
@@ -3488,50 +3528,21 @@
           </a:p>
         </p:txBody>
       </p:sp>
-      <p:pic>
-        <p:nvPicPr>
-          <p:cNvPr id="5" name="Picture 4">
-            <a:extLst>
-              <a:ext uri="{FF2B5EF4-FFF2-40B4-BE49-F238E27FC236}">
-                <a16:creationId xmlns:a16="http://schemas.microsoft.com/office/drawing/2014/main" id="{C90A5458-EEB6-482E-3D84-E2F5DA4E20EE}"/>
-              </a:ext>
-            </a:extLst>
-          </p:cNvPr>
-          <p:cNvPicPr>
-            <a:picLocks noChangeAspect="1"/>
-          </p:cNvPicPr>
+      <p:sp>
+        <p:nvSpPr>
+          <p:cNvPr id="6" name="Rectangle 5">
+            <a:extLst>
+              <a:ext uri="{FF2B5EF4-FFF2-40B4-BE49-F238E27FC236}">
+                <a16:creationId xmlns:a16="http://schemas.microsoft.com/office/drawing/2014/main" id="{B4993D28-6661-9CF1-179E-8DC78EEEDE2E}"/>
+              </a:ext>
+            </a:extLst>
+          </p:cNvPr>
+          <p:cNvSpPr/>
           <p:nvPr/>
-        </p:nvPicPr>
-        <p:blipFill rotWithShape="1">
-          <a:blip r:embed="rId2"/>
-          <a:srcRect t="2141"/>
-          <a:stretch/>
-        </p:blipFill>
+        </p:nvSpPr>
         <p:spPr>
           <a:xfrm>
-            <a:off x="90343" y="1487426"/>
-            <a:ext cx="8353013" cy="5005449"/>
-          </a:xfrm>
-          <a:prstGeom prst="rect">
-            <a:avLst/>
-          </a:prstGeom>
-        </p:spPr>
-      </p:pic>
-      <p:sp>
-        <p:nvSpPr>
-          <p:cNvPr id="6" name="Rectangle 5">
-            <a:extLst>
-              <a:ext uri="{FF2B5EF4-FFF2-40B4-BE49-F238E27FC236}">
-                <a16:creationId xmlns:a16="http://schemas.microsoft.com/office/drawing/2014/main" id="{B4993D28-6661-9CF1-179E-8DC78EEEDE2E}"/>
-              </a:ext>
-            </a:extLst>
-          </p:cNvPr>
-          <p:cNvSpPr/>
-          <p:nvPr/>
-        </p:nvSpPr>
-        <p:spPr>
-          <a:xfrm>
-            <a:off x="2202873" y="1487426"/>
+            <a:off x="2190998" y="1404298"/>
             <a:ext cx="279070" cy="406688"/>
           </a:xfrm>
           <a:prstGeom prst="rect">
@@ -3583,7 +3594,7 @@
         </p:nvSpPr>
         <p:spPr>
           <a:xfrm>
-            <a:off x="2012867" y="1339552"/>
+            <a:off x="2000992" y="1256424"/>
             <a:ext cx="279070" cy="279070"/>
           </a:xfrm>
           <a:prstGeom prst="ellipse">
@@ -3640,7 +3651,7 @@
         </p:nvSpPr>
         <p:spPr>
           <a:xfrm>
-            <a:off x="166254" y="6089681"/>
+            <a:off x="166254" y="5988742"/>
             <a:ext cx="279070" cy="279070"/>
           </a:xfrm>
           <a:prstGeom prst="ellipse">
@@ -3697,7 +3708,7 @@
         </p:nvSpPr>
         <p:spPr>
           <a:xfrm>
-            <a:off x="381699" y="6191849"/>
+            <a:off x="381699" y="6090910"/>
             <a:ext cx="1043339" cy="345517"/>
           </a:xfrm>
           <a:prstGeom prst="rect">
@@ -4297,6 +4308,36 @@
           <a:chExt cx="0" cy="0"/>
         </a:xfrm>
       </p:grpSpPr>
+      <p:pic>
+        <p:nvPicPr>
+          <p:cNvPr id="9" name="Picture 8">
+            <a:extLst>
+              <a:ext uri="{FF2B5EF4-FFF2-40B4-BE49-F238E27FC236}">
+                <a16:creationId xmlns:a16="http://schemas.microsoft.com/office/drawing/2014/main" id="{D6774B90-17A6-6697-9E19-62EC7DFD57BF}"/>
+              </a:ext>
+            </a:extLst>
+          </p:cNvPr>
+          <p:cNvPicPr>
+            <a:picLocks noChangeAspect="1"/>
+          </p:cNvPicPr>
+          <p:nvPr/>
+        </p:nvPicPr>
+        <p:blipFill>
+          <a:blip r:embed="rId2"/>
+          <a:stretch>
+            <a:fillRect/>
+          </a:stretch>
+        </p:blipFill>
+        <p:spPr>
+          <a:xfrm>
+            <a:off x="73408" y="1490354"/>
+            <a:ext cx="8407142" cy="4351338"/>
+          </a:xfrm>
+          <a:prstGeom prst="rect">
+            <a:avLst/>
+          </a:prstGeom>
+        </p:spPr>
+      </p:pic>
       <p:sp>
         <p:nvSpPr>
           <p:cNvPr id="2" name="Title 1">
@@ -4378,35 +4419,6 @@
           </a:p>
         </p:txBody>
       </p:sp>
-      <p:pic>
-        <p:nvPicPr>
-          <p:cNvPr id="5" name="Picture 4">
-            <a:extLst>
-              <a:ext uri="{FF2B5EF4-FFF2-40B4-BE49-F238E27FC236}">
-                <a16:creationId xmlns:a16="http://schemas.microsoft.com/office/drawing/2014/main" id="{C90A5458-EEB6-482E-3D84-E2F5DA4E20EE}"/>
-              </a:ext>
-            </a:extLst>
-          </p:cNvPr>
-          <p:cNvPicPr>
-            <a:picLocks noChangeAspect="1"/>
-          </p:cNvPicPr>
-          <p:nvPr/>
-        </p:nvPicPr>
-        <p:blipFill rotWithShape="1">
-          <a:blip r:embed="rId2"/>
-          <a:srcRect l="1548" t="9976"/>
-          <a:stretch/>
-        </p:blipFill>
-        <p:spPr>
-          <a:xfrm>
-            <a:off x="73407" y="1490354"/>
-            <a:ext cx="8369949" cy="4686609"/>
-          </a:xfrm>
-          <a:prstGeom prst="rect">
-            <a:avLst/>
-          </a:prstGeom>
-        </p:spPr>
-      </p:pic>
       <p:sp>
         <p:nvSpPr>
           <p:cNvPr id="4" name="Oval 3">
@@ -4603,6 +4615,36 @@
           <a:chExt cx="0" cy="0"/>
         </a:xfrm>
       </p:grpSpPr>
+      <p:pic>
+        <p:nvPicPr>
+          <p:cNvPr id="13" name="Picture 12">
+            <a:extLst>
+              <a:ext uri="{FF2B5EF4-FFF2-40B4-BE49-F238E27FC236}">
+                <a16:creationId xmlns:a16="http://schemas.microsoft.com/office/drawing/2014/main" id="{A28768EF-CA99-BA65-7C3F-4C512742A6C1}"/>
+              </a:ext>
+            </a:extLst>
+          </p:cNvPr>
+          <p:cNvPicPr>
+            <a:picLocks noChangeAspect="1"/>
+          </p:cNvPicPr>
+          <p:nvPr/>
+        </p:nvPicPr>
+        <p:blipFill>
+          <a:blip r:embed="rId2"/>
+          <a:stretch>
+            <a:fillRect/>
+          </a:stretch>
+        </p:blipFill>
+        <p:spPr>
+          <a:xfrm>
+            <a:off x="40187" y="1333562"/>
+            <a:ext cx="8403169" cy="4747384"/>
+          </a:xfrm>
+          <a:prstGeom prst="rect">
+            <a:avLst/>
+          </a:prstGeom>
+        </p:spPr>
+      </p:pic>
       <p:sp>
         <p:nvSpPr>
           <p:cNvPr id="2" name="Title 1">
@@ -4697,35 +4739,6 @@
           </a:p>
         </p:txBody>
       </p:sp>
-      <p:pic>
-        <p:nvPicPr>
-          <p:cNvPr id="8" name="Picture 7">
-            <a:extLst>
-              <a:ext uri="{FF2B5EF4-FFF2-40B4-BE49-F238E27FC236}">
-                <a16:creationId xmlns:a16="http://schemas.microsoft.com/office/drawing/2014/main" id="{213CB422-7707-EADF-0989-5C2329112163}"/>
-              </a:ext>
-            </a:extLst>
-          </p:cNvPr>
-          <p:cNvPicPr>
-            <a:picLocks noChangeAspect="1"/>
-          </p:cNvPicPr>
-          <p:nvPr/>
-        </p:nvPicPr>
-        <p:blipFill rotWithShape="1">
-          <a:blip r:embed="rId2"/>
-          <a:srcRect r="9330"/>
-          <a:stretch/>
-        </p:blipFill>
-        <p:spPr>
-          <a:xfrm>
-            <a:off x="40187" y="1342901"/>
-            <a:ext cx="8403169" cy="5081649"/>
-          </a:xfrm>
-          <a:prstGeom prst="rect">
-            <a:avLst/>
-          </a:prstGeom>
-        </p:spPr>
-      </p:pic>
       <p:sp>
         <p:nvSpPr>
           <p:cNvPr id="9" name="Oval 8">
@@ -4993,10 +5006,10 @@
       </p:sp>
       <p:pic>
         <p:nvPicPr>
-          <p:cNvPr id="5" name="Picture 4">
-            <a:extLst>
-              <a:ext uri="{FF2B5EF4-FFF2-40B4-BE49-F238E27FC236}">
-                <a16:creationId xmlns:a16="http://schemas.microsoft.com/office/drawing/2014/main" id="{DF1DE055-B4AB-3B34-936F-98A23EB4B3A8}"/>
+          <p:cNvPr id="8" name="Picture 7">
+            <a:extLst>
+              <a:ext uri="{FF2B5EF4-FFF2-40B4-BE49-F238E27FC236}">
+                <a16:creationId xmlns:a16="http://schemas.microsoft.com/office/drawing/2014/main" id="{D085F238-81EA-01E0-05B5-E54307C241FF}"/>
               </a:ext>
             </a:extLst>
           </p:cNvPr>
@@ -5013,8 +5026,8 @@
         </p:blipFill>
         <p:spPr>
           <a:xfrm>
-            <a:off x="77189" y="1673722"/>
-            <a:ext cx="8243134" cy="4655144"/>
+            <a:off x="65314" y="1459688"/>
+            <a:ext cx="8375833" cy="4717276"/>
           </a:xfrm>
           <a:prstGeom prst="rect">
             <a:avLst/>

</xml_diff>